<commit_message>
[add] ptit travail pepouzeé
</commit_message>
<xml_diff>
--- a/Templates/goldman sachs International.pptx
+++ b/Templates/goldman sachs International.pptx
@@ -880,7 +880,7 @@
           <a:p>
             <a:fld id="{515CCE07-1711-4DC7-A7D8-7ED312C82FB8}" type="datetimeFigureOut">
               <a:rPr lang="fr-FR" smtClean="0"/>
-              <a:t>28/06/2022</a:t>
+              <a:t>29/06/2022</a:t>
             </a:fld>
             <a:endParaRPr lang="fr-FR"/>
           </a:p>
@@ -1045,7 +1045,7 @@
           <a:p>
             <a:fld id="{014ABEAC-8B63-4BD1-9569-A14EB8752A94}" type="datetimeFigureOut">
               <a:rPr lang="fr-FR" smtClean="0"/>
-              <a:t>28/06/2022</a:t>
+              <a:t>29/06/2022</a:t>
             </a:fld>
             <a:endParaRPr lang="fr-FR"/>
           </a:p>
@@ -4380,7 +4380,7 @@
         <p:spPr>
           <a:xfrm>
             <a:off x="4023084" y="7477376"/>
-            <a:ext cx="3239378" cy="1338828"/>
+            <a:ext cx="3239378" cy="1231106"/>
           </a:xfrm>
           <a:prstGeom prst="rect">
             <a:avLst/>
@@ -4426,26 +4426,7 @@
                   <a:schemeClr val="tx2"/>
                 </a:solidFill>
               </a:rPr>
-              <a:t>, &lt;SJR1&gt; clôture à un &lt;SJR3&gt; supérieur à </a:t>
-            </a:r>
-            <a:r>
-              <a:rPr lang="fr-FR" sz="700" dirty="0">
-                <a:solidFill>
-                  <a:schemeClr val="tx2"/>
-                </a:solidFill>
-                <a:highlight>
-                  <a:srgbClr val="FF00FF"/>
-                </a:highlight>
-              </a:rPr>
-              <a:t>&lt;ABAC2</a:t>
-            </a:r>
-            <a:r>
-              <a:rPr lang="fr-FR" sz="700" dirty="0">
-                <a:solidFill>
-                  <a:schemeClr val="tx2"/>
-                </a:solidFill>
-              </a:rPr>
-              <a:t>&gt;. Le produit verse alors un coupon de &lt;CPN&gt; au titre de chaque &lt;F0&gt;.</a:t>
+              <a:t>, &lt;SJR1&gt; clôture à un &lt;SJR3&gt; supérieur à &lt;ABAC2&gt;. Le produit verse alors un coupon de &lt;CPN&gt; au titre de chaque &lt;F0&gt;.</a:t>
             </a:r>
           </a:p>
           <a:p>
@@ -7071,36 +7052,6 @@
           <a:chExt cx="0" cy="0"/>
         </a:xfrm>
       </p:grpSpPr>
-      <p:sp>
-        <p:nvSpPr>
-          <p:cNvPr id="2" name="Espace réservé du numéro de diapositive 1">
-            <a:extLst>
-              <a:ext uri="{FF2B5EF4-FFF2-40B4-BE49-F238E27FC236}">
-                <a16:creationId xmlns:a16="http://schemas.microsoft.com/office/drawing/2014/main" id="{0C33C7E1-5760-4AFF-97B6-9362D2C8CD65}"/>
-              </a:ext>
-            </a:extLst>
-          </p:cNvPr>
-          <p:cNvSpPr>
-            <a:spLocks noGrp="1"/>
-          </p:cNvSpPr>
-          <p:nvPr>
-            <p:ph type="sldNum" sz="quarter" idx="4"/>
-          </p:nvPr>
-        </p:nvSpPr>
-        <p:spPr/>
-        <p:txBody>
-          <a:bodyPr/>
-          <a:lstStyle/>
-          <a:p>
-            <a:fld id="{58F0BA28-1212-45AE-B075-64C06113A6D3}" type="slidenum">
-              <a:rPr lang="fr-FR" smtClean="0"/>
-              <a:pPr/>
-              <a:t>12</a:t>
-            </a:fld>
-            <a:endParaRPr lang="fr-FR" dirty="0"/>
-          </a:p>
-        </p:txBody>
-      </p:sp>
       <p:graphicFrame>
         <p:nvGraphicFramePr>
           <p:cNvPr id="4" name="Tableau 3">
@@ -7116,14 +7067,14 @@
           <p:nvPr>
             <p:extLst>
               <p:ext uri="{D42A27DB-BD31-4B8C-83A1-F6EECF244321}">
-                <p14:modId xmlns:p14="http://schemas.microsoft.com/office/powerpoint/2010/main" val="2414779296"/>
+                <p14:modId xmlns:p14="http://schemas.microsoft.com/office/powerpoint/2010/main" val="308720706"/>
               </p:ext>
             </p:extLst>
           </p:nvPr>
         </p:nvGraphicFramePr>
         <p:xfrm>
-          <a:off x="361950" y="979297"/>
-          <a:ext cx="6837886" cy="8391811"/>
+          <a:off x="359837" y="785555"/>
+          <a:ext cx="6837886" cy="8485411"/>
         </p:xfrm>
         <a:graphic>
           <a:graphicData uri="http://schemas.openxmlformats.org/drawingml/2006/table">
@@ -7147,6 +7098,171 @@
                   </a:extLst>
                 </a:gridCol>
               </a:tblGrid>
+              <a:tr h="125603">
+                <a:tc>
+                  <a:txBody>
+                    <a:bodyPr/>
+                    <a:lstStyle/>
+                    <a:p>
+                      <a:pPr marL="0" marR="0" lvl="0" indent="0" algn="l" defTabSz="755934" rtl="0" eaLnBrk="1" fontAlgn="auto" latinLnBrk="0" hangingPunct="1">
+                        <a:lnSpc>
+                          <a:spcPct val="90000"/>
+                        </a:lnSpc>
+                        <a:spcBef>
+                          <a:spcPts val="0"/>
+                        </a:spcBef>
+                        <a:spcAft>
+                          <a:spcPts val="0"/>
+                        </a:spcAft>
+                        <a:buClrTx/>
+                        <a:buSzTx/>
+                        <a:buFontTx/>
+                        <a:buNone/>
+                        <a:tabLst/>
+                        <a:defRPr/>
+                      </a:pPr>
+                      <a:endParaRPr lang="fr-FR" sz="700" b="1" kern="1200" dirty="0">
+                        <a:solidFill>
+                          <a:srgbClr val="B9A049"/>
+                        </a:solidFill>
+                        <a:latin typeface="+mn-lt"/>
+                        <a:ea typeface="+mn-ea"/>
+                        <a:cs typeface="+mn-cs"/>
+                      </a:endParaRPr>
+                    </a:p>
+                  </a:txBody>
+                  <a:tcPr marL="72000" marR="72000" marT="46800" marB="46800" anchor="ctr">
+                    <a:lnL w="12700" cap="flat" cmpd="sng" algn="ctr">
+                      <a:solidFill>
+                        <a:schemeClr val="bg1">
+                          <a:lumMod val="85000"/>
+                        </a:schemeClr>
+                      </a:solidFill>
+                      <a:prstDash val="solid"/>
+                      <a:round/>
+                      <a:headEnd type="none" w="med" len="med"/>
+                      <a:tailEnd type="none" w="med" len="med"/>
+                    </a:lnL>
+                    <a:lnR w="12700" cap="flat" cmpd="sng" algn="ctr">
+                      <a:solidFill>
+                        <a:schemeClr val="bg1"/>
+                      </a:solidFill>
+                      <a:prstDash val="solid"/>
+                      <a:round/>
+                      <a:headEnd type="none" w="med" len="med"/>
+                      <a:tailEnd type="none" w="med" len="med"/>
+                    </a:lnR>
+                    <a:lnT w="12700" cap="flat" cmpd="sng" algn="ctr">
+                      <a:solidFill>
+                        <a:schemeClr val="bg1"/>
+                      </a:solidFill>
+                      <a:prstDash val="solid"/>
+                      <a:round/>
+                      <a:headEnd type="none" w="med" len="med"/>
+                      <a:tailEnd type="none" w="med" len="med"/>
+                    </a:lnT>
+                    <a:lnB w="12700" cap="flat" cmpd="sng" algn="ctr">
+                      <a:solidFill>
+                        <a:schemeClr val="bg1"/>
+                      </a:solidFill>
+                      <a:prstDash val="solid"/>
+                      <a:round/>
+                      <a:headEnd type="none" w="med" len="med"/>
+                      <a:tailEnd type="none" w="med" len="med"/>
+                    </a:lnB>
+                    <a:lnTlToBr w="12700" cmpd="sng">
+                      <a:noFill/>
+                      <a:prstDash val="solid"/>
+                    </a:lnTlToBr>
+                    <a:lnBlToTr w="12700" cmpd="sng">
+                      <a:noFill/>
+                      <a:prstDash val="solid"/>
+                    </a:lnBlToTr>
+                    <a:solidFill>
+                      <a:schemeClr val="bg1">
+                        <a:lumMod val="95000"/>
+                      </a:schemeClr>
+                    </a:solidFill>
+                  </a:tcPr>
+                </a:tc>
+                <a:tc>
+                  <a:txBody>
+                    <a:bodyPr/>
+                    <a:lstStyle/>
+                    <a:p>
+                      <a:pPr algn="just">
+                        <a:lnSpc>
+                          <a:spcPct val="90000"/>
+                        </a:lnSpc>
+                      </a:pPr>
+                      <a:endParaRPr lang="fr-FR" sz="700" b="1" i="0" dirty="0">
+                        <a:solidFill>
+                          <a:schemeClr val="tx1"/>
+                        </a:solidFill>
+                        <a:latin typeface="+mn-lt"/>
+                      </a:endParaRPr>
+                    </a:p>
+                  </a:txBody>
+                  <a:tcPr marL="36000" marR="36000" marT="46800" marB="46800" anchor="ctr">
+                    <a:lnL w="12700" cap="flat" cmpd="sng" algn="ctr">
+                      <a:solidFill>
+                        <a:schemeClr val="bg1"/>
+                      </a:solidFill>
+                      <a:prstDash val="solid"/>
+                      <a:round/>
+                      <a:headEnd type="none" w="med" len="med"/>
+                      <a:tailEnd type="none" w="med" len="med"/>
+                    </a:lnL>
+                    <a:lnR w="6350" cap="flat" cmpd="sng" algn="ctr">
+                      <a:solidFill>
+                        <a:schemeClr val="bg1">
+                          <a:lumMod val="65000"/>
+                        </a:schemeClr>
+                      </a:solidFill>
+                      <a:prstDash val="solid"/>
+                      <a:round/>
+                      <a:headEnd type="none" w="med" len="med"/>
+                      <a:tailEnd type="none" w="med" len="med"/>
+                    </a:lnR>
+                    <a:lnT w="6350" cap="flat" cmpd="sng" algn="ctr">
+                      <a:solidFill>
+                        <a:schemeClr val="bg1">
+                          <a:lumMod val="65000"/>
+                        </a:schemeClr>
+                      </a:solidFill>
+                      <a:prstDash val="solid"/>
+                      <a:round/>
+                      <a:headEnd type="none" w="med" len="med"/>
+                      <a:tailEnd type="none" w="med" len="med"/>
+                    </a:lnT>
+                    <a:lnB w="6350" cap="flat" cmpd="sng" algn="ctr">
+                      <a:solidFill>
+                        <a:schemeClr val="bg1">
+                          <a:lumMod val="65000"/>
+                        </a:schemeClr>
+                      </a:solidFill>
+                      <a:prstDash val="solid"/>
+                      <a:round/>
+                      <a:headEnd type="none" w="med" len="med"/>
+                      <a:tailEnd type="none" w="med" len="med"/>
+                    </a:lnB>
+                    <a:lnTlToBr w="12700" cmpd="sng">
+                      <a:noFill/>
+                      <a:prstDash val="solid"/>
+                    </a:lnTlToBr>
+                    <a:lnBlToTr w="12700" cmpd="sng">
+                      <a:noFill/>
+                      <a:prstDash val="solid"/>
+                    </a:lnBlToTr>
+                    <a:noFill/>
+                  </a:tcPr>
+                </a:tc>
+                <a:extLst>
+                  <a:ext uri="{0D108BD9-81ED-4DB2-BD59-A6C34878D82A}">
+                    <a16:rowId xmlns:a16="http://schemas.microsoft.com/office/drawing/2014/main" val="2846341050"/>
+                  </a:ext>
+                </a:extLst>
+              </a:tr>
               <a:tr h="268891">
                 <a:tc>
                   <a:txBody>
@@ -13255,9 +13371,7 @@
                     </a:lnT>
                     <a:lnB w="12700" cap="flat" cmpd="sng" algn="ctr">
                       <a:solidFill>
-                        <a:schemeClr val="bg1">
-                          <a:lumMod val="85000"/>
-                        </a:schemeClr>
+                        <a:schemeClr val="tx1"/>
                       </a:solidFill>
                       <a:prstDash val="solid"/>
                       <a:round/>
@@ -13339,11 +13453,9 @@
                       <a:headEnd type="none" w="med" len="med"/>
                       <a:tailEnd type="none" w="med" len="med"/>
                     </a:lnT>
-                    <a:lnB w="6350" cap="flat" cmpd="sng" algn="ctr">
-                      <a:solidFill>
-                        <a:schemeClr val="bg1">
-                          <a:lumMod val="65000"/>
-                        </a:schemeClr>
+                    <a:lnB w="12700" cap="flat" cmpd="sng" algn="ctr">
+                      <a:solidFill>
+                        <a:schemeClr val="tx1"/>
                       </a:solidFill>
                       <a:prstDash val="solid"/>
                       <a:round/>
@@ -13371,6 +13483,36 @@
           </a:graphicData>
         </a:graphic>
       </p:graphicFrame>
+      <p:sp>
+        <p:nvSpPr>
+          <p:cNvPr id="2" name="Espace réservé du numéro de diapositive 1">
+            <a:extLst>
+              <a:ext uri="{FF2B5EF4-FFF2-40B4-BE49-F238E27FC236}">
+                <a16:creationId xmlns:a16="http://schemas.microsoft.com/office/drawing/2014/main" id="{0C33C7E1-5760-4AFF-97B6-9362D2C8CD65}"/>
+              </a:ext>
+            </a:extLst>
+          </p:cNvPr>
+          <p:cNvSpPr>
+            <a:spLocks noGrp="1"/>
+          </p:cNvSpPr>
+          <p:nvPr>
+            <p:ph type="sldNum" sz="quarter" idx="4"/>
+          </p:nvPr>
+        </p:nvSpPr>
+        <p:spPr/>
+        <p:txBody>
+          <a:bodyPr/>
+          <a:lstStyle/>
+          <a:p>
+            <a:fld id="{58F0BA28-1212-45AE-B075-64C06113A6D3}" type="slidenum">
+              <a:rPr lang="fr-FR" smtClean="0"/>
+              <a:pPr/>
+              <a:t>12</a:t>
+            </a:fld>
+            <a:endParaRPr lang="fr-FR" dirty="0"/>
+          </a:p>
+        </p:txBody>
+      </p:sp>
       <p:sp>
         <p:nvSpPr>
           <p:cNvPr id="6" name="Espace réservé du texte 11">
@@ -13748,14 +13890,14 @@
           <p:nvPr>
             <p:extLst>
               <p:ext uri="{D42A27DB-BD31-4B8C-83A1-F6EECF244321}">
-                <p14:modId xmlns:p14="http://schemas.microsoft.com/office/powerpoint/2010/main" val="4146365128"/>
+                <p14:modId xmlns:p14="http://schemas.microsoft.com/office/powerpoint/2010/main" val="428778589"/>
               </p:ext>
             </p:extLst>
           </p:nvPr>
         </p:nvGraphicFramePr>
         <p:xfrm>
-          <a:off x="360894" y="641350"/>
-          <a:ext cx="6837886" cy="8501540"/>
+          <a:off x="348006" y="429639"/>
+          <a:ext cx="6837886" cy="8415943"/>
         </p:xfrm>
         <a:graphic>
           <a:graphicData uri="http://schemas.openxmlformats.org/drawingml/2006/table">
@@ -13925,6 +14067,175 @@
                 <a:extLst>
                   <a:ext uri="{0D108BD9-81ED-4DB2-BD59-A6C34878D82A}">
                     <a16:rowId xmlns:a16="http://schemas.microsoft.com/office/drawing/2014/main" val="405921866"/>
+                  </a:ext>
+                </a:extLst>
+              </a:tr>
+              <a:tr h="174072">
+                <a:tc>
+                  <a:txBody>
+                    <a:bodyPr/>
+                    <a:lstStyle/>
+                    <a:p>
+                      <a:pPr marL="0" marR="0" lvl="0" indent="0" algn="l" defTabSz="755934" rtl="0" eaLnBrk="1" fontAlgn="auto" latinLnBrk="0" hangingPunct="1">
+                        <a:lnSpc>
+                          <a:spcPct val="90000"/>
+                        </a:lnSpc>
+                        <a:spcBef>
+                          <a:spcPts val="0"/>
+                        </a:spcBef>
+                        <a:spcAft>
+                          <a:spcPts val="0"/>
+                        </a:spcAft>
+                        <a:buClrTx/>
+                        <a:buSzTx/>
+                        <a:buFontTx/>
+                        <a:buNone/>
+                        <a:tabLst/>
+                        <a:defRPr/>
+                      </a:pPr>
+                      <a:endParaRPr lang="fr-FR" sz="700" b="1" kern="1200" dirty="0">
+                        <a:solidFill>
+                          <a:srgbClr val="B9A049"/>
+                        </a:solidFill>
+                        <a:latin typeface="+mn-lt"/>
+                        <a:ea typeface="+mn-ea"/>
+                        <a:cs typeface="+mn-cs"/>
+                      </a:endParaRPr>
+                    </a:p>
+                  </a:txBody>
+                  <a:tcPr marL="72000" marR="72000" marT="46800" marB="46800" anchor="ctr">
+                    <a:lnL w="12700" cap="flat" cmpd="sng" algn="ctr">
+                      <a:solidFill>
+                        <a:schemeClr val="bg1">
+                          <a:lumMod val="85000"/>
+                        </a:schemeClr>
+                      </a:solidFill>
+                      <a:prstDash val="solid"/>
+                      <a:round/>
+                      <a:headEnd type="none" w="med" len="med"/>
+                      <a:tailEnd type="none" w="med" len="med"/>
+                    </a:lnL>
+                    <a:lnR w="12700" cap="flat" cmpd="sng" algn="ctr">
+                      <a:solidFill>
+                        <a:schemeClr val="bg1"/>
+                      </a:solidFill>
+                      <a:prstDash val="solid"/>
+                      <a:round/>
+                      <a:headEnd type="none" w="med" len="med"/>
+                      <a:tailEnd type="none" w="med" len="med"/>
+                    </a:lnR>
+                    <a:lnT w="6350" cap="flat" cmpd="sng" algn="ctr">
+                      <a:solidFill>
+                        <a:schemeClr val="bg1">
+                          <a:lumMod val="50000"/>
+                        </a:schemeClr>
+                      </a:solidFill>
+                      <a:prstDash val="solid"/>
+                      <a:round/>
+                      <a:headEnd type="none" w="med" len="med"/>
+                      <a:tailEnd type="none" w="med" len="med"/>
+                    </a:lnT>
+                    <a:lnB w="6350" cap="flat" cmpd="sng" algn="ctr">
+                      <a:solidFill>
+                        <a:schemeClr val="bg1">
+                          <a:lumMod val="50000"/>
+                        </a:schemeClr>
+                      </a:solidFill>
+                      <a:prstDash val="solid"/>
+                      <a:round/>
+                      <a:headEnd type="none" w="med" len="med"/>
+                      <a:tailEnd type="none" w="med" len="med"/>
+                    </a:lnB>
+                    <a:lnTlToBr w="12700" cmpd="sng">
+                      <a:noFill/>
+                      <a:prstDash val="solid"/>
+                    </a:lnTlToBr>
+                    <a:lnBlToTr w="12700" cmpd="sng">
+                      <a:noFill/>
+                      <a:prstDash val="solid"/>
+                    </a:lnBlToTr>
+                    <a:solidFill>
+                      <a:schemeClr val="bg1">
+                        <a:lumMod val="95000"/>
+                      </a:schemeClr>
+                    </a:solidFill>
+                  </a:tcPr>
+                </a:tc>
+                <a:tc>
+                  <a:txBody>
+                    <a:bodyPr/>
+                    <a:lstStyle/>
+                    <a:p>
+                      <a:pPr algn="just">
+                        <a:lnSpc>
+                          <a:spcPct val="90000"/>
+                        </a:lnSpc>
+                      </a:pPr>
+                      <a:endParaRPr lang="fr-FR" sz="700" b="1" i="0" dirty="0">
+                        <a:solidFill>
+                          <a:schemeClr val="tx1"/>
+                        </a:solidFill>
+                        <a:latin typeface="+mn-lt"/>
+                      </a:endParaRPr>
+                    </a:p>
+                  </a:txBody>
+                  <a:tcPr marL="36000" marR="36000" marT="46800" marB="46800" anchor="ctr">
+                    <a:lnL w="12700" cap="flat" cmpd="sng" algn="ctr">
+                      <a:solidFill>
+                        <a:schemeClr val="bg1"/>
+                      </a:solidFill>
+                      <a:prstDash val="solid"/>
+                      <a:round/>
+                      <a:headEnd type="none" w="med" len="med"/>
+                      <a:tailEnd type="none" w="med" len="med"/>
+                    </a:lnL>
+                    <a:lnR w="6350" cap="flat" cmpd="sng" algn="ctr">
+                      <a:solidFill>
+                        <a:schemeClr val="bg1">
+                          <a:lumMod val="65000"/>
+                        </a:schemeClr>
+                      </a:solidFill>
+                      <a:prstDash val="solid"/>
+                      <a:round/>
+                      <a:headEnd type="none" w="med" len="med"/>
+                      <a:tailEnd type="none" w="med" len="med"/>
+                    </a:lnR>
+                    <a:lnT w="6350" cap="flat" cmpd="sng" algn="ctr">
+                      <a:solidFill>
+                        <a:schemeClr val="bg1">
+                          <a:lumMod val="50000"/>
+                        </a:schemeClr>
+                      </a:solidFill>
+                      <a:prstDash val="solid"/>
+                      <a:round/>
+                      <a:headEnd type="none" w="med" len="med"/>
+                      <a:tailEnd type="none" w="med" len="med"/>
+                    </a:lnT>
+                    <a:lnB w="6350" cap="flat" cmpd="sng" algn="ctr">
+                      <a:solidFill>
+                        <a:schemeClr val="bg1">
+                          <a:lumMod val="50000"/>
+                        </a:schemeClr>
+                      </a:solidFill>
+                      <a:prstDash val="solid"/>
+                      <a:round/>
+                      <a:headEnd type="none" w="med" len="med"/>
+                      <a:tailEnd type="none" w="med" len="med"/>
+                    </a:lnB>
+                    <a:lnTlToBr w="12700" cmpd="sng">
+                      <a:noFill/>
+                      <a:prstDash val="solid"/>
+                    </a:lnTlToBr>
+                    <a:lnBlToTr w="12700" cmpd="sng">
+                      <a:noFill/>
+                      <a:prstDash val="solid"/>
+                    </a:lnBlToTr>
+                    <a:noFill/>
+                  </a:tcPr>
+                </a:tc>
+                <a:extLst>
+                  <a:ext uri="{0D108BD9-81ED-4DB2-BD59-A6C34878D82A}">
+                    <a16:rowId xmlns:a16="http://schemas.microsoft.com/office/drawing/2014/main" val="1467051418"/>
                   </a:ext>
                 </a:extLst>
               </a:tr>
@@ -20037,7 +20348,7 @@
         </p:nvSpPr>
         <p:spPr>
           <a:xfrm>
-            <a:off x="458462" y="612930"/>
+            <a:off x="407669" y="623706"/>
             <a:ext cx="6804000" cy="230950"/>
           </a:xfrm>
           <a:prstGeom prst="rect">
@@ -24466,15 +24777,21 @@
                 <a:ea typeface="+mn-ea"/>
                 <a:cs typeface="+mn-cs"/>
               </a:rPr>
-              <a:t>: En acceptant de limiter leurs gains à &lt;CPN&gt; par &lt;F0&gt; écoulé (soit un Taux de Rendement Annuel net maximum de &lt;TRA.F.A&gt;%(2)), les investisseurs recevront en contrepartie l’intégralité du capital initial si &lt;SJR1&gt; ne baisse pas de plus de &lt;</a:t>
-            </a:r>
-            <a:r>
-              <a:rPr lang="fr-FR" sz="800" dirty="0">
-                <a:solidFill>
-                  <a:srgbClr val="000000"/>
-                </a:solidFill>
-              </a:rPr>
-              <a:t>PDIPERF&gt;</a:t>
+              <a:t>: En acceptant de limiter leurs gains à &lt;CPN&gt; par &lt;F0&gt; écoulé (soit un Taux de Rendement Annuel net maximum de &lt;TRA.F.A&gt;</a:t>
+            </a:r>
+            <a:r>
+              <a:rPr kumimoji="0" lang="fr-FR" sz="800" b="0" i="0" u="none" strike="noStrike" kern="1200" cap="none" spc="0" normalizeH="0" baseline="30000" noProof="0" dirty="0">
+                <a:ln>
+                  <a:noFill/>
+                </a:ln>
+                <a:effectLst/>
+                <a:uLnTx/>
+                <a:uFillTx/>
+                <a:latin typeface="Proxima Nova Rg"/>
+                <a:ea typeface="+mn-ea"/>
+                <a:cs typeface="+mn-cs"/>
+              </a:rPr>
+              <a:t>(2)</a:t>
             </a:r>
             <a:r>
               <a:rPr kumimoji="0" lang="fr-FR" sz="800" b="0" i="0" u="none" strike="noStrike" kern="1200" cap="none" spc="0" normalizeH="0" baseline="0" noProof="0" dirty="0">
@@ -24491,7 +24808,38 @@
                 <a:ea typeface="+mn-ea"/>
                 <a:cs typeface="+mn-cs"/>
               </a:rPr>
-              <a:t> par rapport à son &lt;NDR&gt; à la date de constatation finale(1).</a:t>
+              <a:t>), les investisseurs recevront en contrepartie l’intégralité du capital initial si &lt;SJR1&gt; ne baisse pas de plus de &lt;PDIPERF&gt; par rapport à son &lt;NDR&gt; à la date de constatation finale</a:t>
+            </a:r>
+            <a:r>
+              <a:rPr kumimoji="0" lang="fr-FR" sz="800" b="0" i="0" u="none" strike="noStrike" kern="1200" cap="none" spc="0" normalizeH="0" baseline="30000" noProof="0" dirty="0">
+                <a:ln>
+                  <a:noFill/>
+                </a:ln>
+                <a:effectLst/>
+                <a:uLnTx/>
+                <a:uFillTx/>
+                <a:latin typeface="Proxima Nova Rg"/>
+                <a:ea typeface="+mn-ea"/>
+                <a:cs typeface="+mn-cs"/>
+              </a:rPr>
+              <a:t>(1)</a:t>
+            </a:r>
+            <a:r>
+              <a:rPr kumimoji="0" lang="fr-FR" sz="800" b="0" i="0" u="none" strike="noStrike" kern="1200" cap="none" spc="0" normalizeH="0" baseline="0" noProof="0" dirty="0">
+                <a:ln>
+                  <a:noFill/>
+                </a:ln>
+                <a:solidFill>
+                  <a:schemeClr val="tx1"/>
+                </a:solidFill>
+                <a:effectLst/>
+                <a:uLnTx/>
+                <a:uFillTx/>
+                <a:latin typeface="Proxima Nova Rg"/>
+                <a:ea typeface="+mn-ea"/>
+                <a:cs typeface="+mn-cs"/>
+              </a:rPr>
+              <a:t>.</a:t>
             </a:r>
           </a:p>
           <a:p>
@@ -29791,19 +30139,7 @@
           <a:p>
             <a:r>
               <a:rPr lang="fr-FR" sz="800" dirty="0"/>
-              <a:t>&lt;balisedeg2&gt; </a:t>
-            </a:r>
-            <a:r>
-              <a:rPr lang="fr-FR" sz="800" dirty="0">
-                <a:highlight>
-                  <a:srgbClr val="FF00FF"/>
-                </a:highlight>
-              </a:rPr>
-              <a:t>&lt;balisedeg3</a:t>
-            </a:r>
-            <a:r>
-              <a:rPr lang="fr-FR" sz="800" dirty="0"/>
-              <a:t>&gt;</a:t>
+              <a:t>&lt;balisedeg2&gt; &lt;balisedeg3&gt;</a:t>
             </a:r>
             <a:endParaRPr lang="en-US" sz="800" dirty="0"/>
           </a:p>
@@ -32451,19 +32787,7 @@
           <a:p>
             <a:r>
               <a:rPr lang="fr-FR" sz="800" dirty="0"/>
-              <a:t>&lt;balisedeg2&gt; </a:t>
-            </a:r>
-            <a:r>
-              <a:rPr lang="fr-FR" sz="800" dirty="0">
-                <a:highlight>
-                  <a:srgbClr val="FF00FF"/>
-                </a:highlight>
-              </a:rPr>
-              <a:t>&lt;balisedeg3</a:t>
-            </a:r>
-            <a:r>
-              <a:rPr lang="fr-FR" sz="800" dirty="0"/>
-              <a:t>&gt;</a:t>
+              <a:t>&lt;balisedeg2&gt; &lt;balisedeg3&gt;</a:t>
             </a:r>
             <a:endParaRPr lang="en-US" sz="800" dirty="0"/>
           </a:p>
@@ -36607,6 +36931,18 @@
 </file>
 
 <file path=customXml/item1.xml><?xml version="1.0" encoding="utf-8"?>
+<p:properties xmlns:p="http://schemas.microsoft.com/office/2006/metadata/properties" xmlns:xsi="http://www.w3.org/2001/XMLSchema-instance" xmlns:pc="http://schemas.microsoft.com/office/infopath/2007/PartnerControls">
+  <documentManagement>
+    <_Flow_SignoffStatus xmlns="ef624bc2-1644-4d69-8362-5c28ca496374" xsi:nil="true"/>
+    <TaxCatchAll xmlns="514a554b-82b0-4359-b247-fc84018a95f0" xsi:nil="true"/>
+    <lcf76f155ced4ddcb4097134ff3c332f xmlns="ef624bc2-1644-4d69-8362-5c28ca496374">
+      <Terms xmlns="http://schemas.microsoft.com/office/infopath/2007/PartnerControls"/>
+    </lcf76f155ced4ddcb4097134ff3c332f>
+  </documentManagement>
+</p:properties>
+</file>
+
+<file path=customXml/item2.xml><?xml version="1.0" encoding="utf-8"?>
 <ct:contentTypeSchema xmlns:ct="http://schemas.microsoft.com/office/2006/metadata/contentType" xmlns:ma="http://schemas.microsoft.com/office/2006/metadata/properties/metaAttributes" ct:_="" ma:_="" ma:contentTypeName="Document" ma:contentTypeID="0x0101005DDE610BC516E448BB8152259F39635A" ma:contentTypeVersion="17" ma:contentTypeDescription="Crée un document." ma:contentTypeScope="" ma:versionID="bfb75e103009df80b8e5001438c41194">
   <xsd:schema xmlns:xsd="http://www.w3.org/2001/XMLSchema" xmlns:xs="http://www.w3.org/2001/XMLSchema" xmlns:p="http://schemas.microsoft.com/office/2006/metadata/properties" xmlns:ns2="ef624bc2-1644-4d69-8362-5c28ca496374" xmlns:ns3="514a554b-82b0-4359-b247-fc84018a95f0" targetNamespace="http://schemas.microsoft.com/office/2006/metadata/properties" ma:root="true" ma:fieldsID="2ae3df86d13efbb4a35042af2564d386" ns2:_="" ns3:_="">
     <xsd:import namespace="ef624bc2-1644-4d69-8362-5c28ca496374"/>
@@ -36855,7 +37191,7 @@
 </ct:contentTypeSchema>
 </file>
 
-<file path=customXml/item2.xml><?xml version="1.0" encoding="utf-8"?>
+<file path=customXml/item3.xml><?xml version="1.0" encoding="utf-8"?>
 <?mso-contentType ?>
 <FormTemplates xmlns="http://schemas.microsoft.com/sharepoint/v3/contenttype/forms">
   <Display>DocumentLibraryForm</Display>
@@ -36864,19 +37200,25 @@
 </FormTemplates>
 </file>
 
-<file path=customXml/item3.xml><?xml version="1.0" encoding="utf-8"?>
-<p:properties xmlns:p="http://schemas.microsoft.com/office/2006/metadata/properties" xmlns:xsi="http://www.w3.org/2001/XMLSchema-instance" xmlns:pc="http://schemas.microsoft.com/office/infopath/2007/PartnerControls">
-  <documentManagement>
-    <_Flow_SignoffStatus xmlns="ef624bc2-1644-4d69-8362-5c28ca496374" xsi:nil="true"/>
-    <TaxCatchAll xmlns="514a554b-82b0-4359-b247-fc84018a95f0" xsi:nil="true"/>
-    <lcf76f155ced4ddcb4097134ff3c332f xmlns="ef624bc2-1644-4d69-8362-5c28ca496374">
-      <Terms xmlns="http://schemas.microsoft.com/office/infopath/2007/PartnerControls"/>
-    </lcf76f155ced4ddcb4097134ff3c332f>
-  </documentManagement>
-</p:properties>
+<file path=customXml/itemProps1.xml><?xml version="1.0" encoding="utf-8"?>
+<ds:datastoreItem xmlns:ds="http://schemas.openxmlformats.org/officeDocument/2006/customXml" ds:itemID="{25DE574B-2CD2-4078-9BEA-2A14717D9698}">
+  <ds:schemaRefs>
+    <ds:schemaRef ds:uri="http://purl.org/dc/terms/"/>
+    <ds:schemaRef ds:uri="http://schemas.microsoft.com/office/infopath/2007/PartnerControls"/>
+    <ds:schemaRef ds:uri="http://schemas.microsoft.com/office/2006/metadata/properties"/>
+    <ds:schemaRef ds:uri="http://www.w3.org/XML/1998/namespace"/>
+    <ds:schemaRef ds:uri="http://schemas.microsoft.com/office/2006/documentManagement/types"/>
+    <ds:schemaRef ds:uri="http://purl.org/dc/elements/1.1/"/>
+    <ds:schemaRef ds:uri="6fcc2ccd-5c68-47b8-8f7d-3c9edbbfd1f2"/>
+    <ds:schemaRef ds:uri="http://schemas.openxmlformats.org/package/2006/metadata/core-properties"/>
+    <ds:schemaRef ds:uri="http://purl.org/dc/dcmitype/"/>
+    <ds:schemaRef ds:uri="ef624bc2-1644-4d69-8362-5c28ca496374"/>
+    <ds:schemaRef ds:uri="514a554b-82b0-4359-b247-fc84018a95f0"/>
+  </ds:schemaRefs>
+</ds:datastoreItem>
 </file>
 
-<file path=customXml/itemProps1.xml><?xml version="1.0" encoding="utf-8"?>
+<file path=customXml/itemProps2.xml><?xml version="1.0" encoding="utf-8"?>
 <ds:datastoreItem xmlns:ds="http://schemas.openxmlformats.org/officeDocument/2006/customXml" ds:itemID="{115E78FA-E8F9-439D-BA67-131B3AD00AC0}">
   <ds:schemaRefs>
     <ds:schemaRef ds:uri="http://schemas.microsoft.com/office/2006/metadata/contentType"/>
@@ -36895,28 +37237,10 @@
 </ds:datastoreItem>
 </file>
 
-<file path=customXml/itemProps2.xml><?xml version="1.0" encoding="utf-8"?>
+<file path=customXml/itemProps3.xml><?xml version="1.0" encoding="utf-8"?>
 <ds:datastoreItem xmlns:ds="http://schemas.openxmlformats.org/officeDocument/2006/customXml" ds:itemID="{B00FC41E-FBDE-42E2-B58A-20EBD240A376}">
   <ds:schemaRefs>
     <ds:schemaRef ds:uri="http://schemas.microsoft.com/sharepoint/v3/contenttype/forms"/>
   </ds:schemaRefs>
 </ds:datastoreItem>
-</file>
-
-<file path=customXml/itemProps3.xml><?xml version="1.0" encoding="utf-8"?>
-<ds:datastoreItem xmlns:ds="http://schemas.openxmlformats.org/officeDocument/2006/customXml" ds:itemID="{25DE574B-2CD2-4078-9BEA-2A14717D9698}">
-  <ds:schemaRefs>
-    <ds:schemaRef ds:uri="http://purl.org/dc/terms/"/>
-    <ds:schemaRef ds:uri="http://schemas.microsoft.com/office/infopath/2007/PartnerControls"/>
-    <ds:schemaRef ds:uri="http://schemas.microsoft.com/office/2006/metadata/properties"/>
-    <ds:schemaRef ds:uri="http://www.w3.org/XML/1998/namespace"/>
-    <ds:schemaRef ds:uri="http://schemas.microsoft.com/office/2006/documentManagement/types"/>
-    <ds:schemaRef ds:uri="http://purl.org/dc/elements/1.1/"/>
-    <ds:schemaRef ds:uri="6fcc2ccd-5c68-47b8-8f7d-3c9edbbfd1f2"/>
-    <ds:schemaRef ds:uri="http://schemas.openxmlformats.org/package/2006/metadata/core-properties"/>
-    <ds:schemaRef ds:uri="http://purl.org/dc/dcmitype/"/>
-    <ds:schemaRef ds:uri="ef624bc2-1644-4d69-8362-5c28ca496374"/>
-    <ds:schemaRef ds:uri="514a554b-82b0-4359-b247-fc84018a95f0"/>
-  </ds:schemaRefs>
-</ds:datastoreItem>
 </file>
</xml_diff>